<commit_message>
fixed AZ relational schema
</commit_message>
<xml_diff>
--- a/Relational Schema and ER Diagram.pptx
+++ b/Relational Schema and ER Diagram.pptx
@@ -263,7 +263,7 @@
           <a:p>
             <a:fld id="{BDBB5EB8-848B-432F-B23B-EE08B2B50E45}" type="datetimeFigureOut">
               <a:rPr lang="en-US" smtClean="0"/>
-              <a:t>4/9/2021</a:t>
+              <a:t>4/11/2021</a:t>
             </a:fld>
             <a:endParaRPr lang="en-US"/>
           </a:p>
@@ -461,7 +461,7 @@
           <a:p>
             <a:fld id="{BDBB5EB8-848B-432F-B23B-EE08B2B50E45}" type="datetimeFigureOut">
               <a:rPr lang="en-US" smtClean="0"/>
-              <a:t>4/9/2021</a:t>
+              <a:t>4/11/2021</a:t>
             </a:fld>
             <a:endParaRPr lang="en-US"/>
           </a:p>
@@ -669,7 +669,7 @@
           <a:p>
             <a:fld id="{BDBB5EB8-848B-432F-B23B-EE08B2B50E45}" type="datetimeFigureOut">
               <a:rPr lang="en-US" smtClean="0"/>
-              <a:t>4/9/2021</a:t>
+              <a:t>4/11/2021</a:t>
             </a:fld>
             <a:endParaRPr lang="en-US"/>
           </a:p>
@@ -867,7 +867,7 @@
           <a:p>
             <a:fld id="{BDBB5EB8-848B-432F-B23B-EE08B2B50E45}" type="datetimeFigureOut">
               <a:rPr lang="en-US" smtClean="0"/>
-              <a:t>4/9/2021</a:t>
+              <a:t>4/11/2021</a:t>
             </a:fld>
             <a:endParaRPr lang="en-US"/>
           </a:p>
@@ -1142,7 +1142,7 @@
           <a:p>
             <a:fld id="{BDBB5EB8-848B-432F-B23B-EE08B2B50E45}" type="datetimeFigureOut">
               <a:rPr lang="en-US" smtClean="0"/>
-              <a:t>4/9/2021</a:t>
+              <a:t>4/11/2021</a:t>
             </a:fld>
             <a:endParaRPr lang="en-US"/>
           </a:p>
@@ -1407,7 +1407,7 @@
           <a:p>
             <a:fld id="{BDBB5EB8-848B-432F-B23B-EE08B2B50E45}" type="datetimeFigureOut">
               <a:rPr lang="en-US" smtClean="0"/>
-              <a:t>4/9/2021</a:t>
+              <a:t>4/11/2021</a:t>
             </a:fld>
             <a:endParaRPr lang="en-US"/>
           </a:p>
@@ -1819,7 +1819,7 @@
           <a:p>
             <a:fld id="{BDBB5EB8-848B-432F-B23B-EE08B2B50E45}" type="datetimeFigureOut">
               <a:rPr lang="en-US" smtClean="0"/>
-              <a:t>4/9/2021</a:t>
+              <a:t>4/11/2021</a:t>
             </a:fld>
             <a:endParaRPr lang="en-US"/>
           </a:p>
@@ -1960,7 +1960,7 @@
           <a:p>
             <a:fld id="{BDBB5EB8-848B-432F-B23B-EE08B2B50E45}" type="datetimeFigureOut">
               <a:rPr lang="en-US" smtClean="0"/>
-              <a:t>4/9/2021</a:t>
+              <a:t>4/11/2021</a:t>
             </a:fld>
             <a:endParaRPr lang="en-US"/>
           </a:p>
@@ -2073,7 +2073,7 @@
           <a:p>
             <a:fld id="{BDBB5EB8-848B-432F-B23B-EE08B2B50E45}" type="datetimeFigureOut">
               <a:rPr lang="en-US" smtClean="0"/>
-              <a:t>4/9/2021</a:t>
+              <a:t>4/11/2021</a:t>
             </a:fld>
             <a:endParaRPr lang="en-US"/>
           </a:p>
@@ -2384,7 +2384,7 @@
           <a:p>
             <a:fld id="{BDBB5EB8-848B-432F-B23B-EE08B2B50E45}" type="datetimeFigureOut">
               <a:rPr lang="en-US" smtClean="0"/>
-              <a:t>4/9/2021</a:t>
+              <a:t>4/11/2021</a:t>
             </a:fld>
             <a:endParaRPr lang="en-US"/>
           </a:p>
@@ -2672,7 +2672,7 @@
           <a:p>
             <a:fld id="{BDBB5EB8-848B-432F-B23B-EE08B2B50E45}" type="datetimeFigureOut">
               <a:rPr lang="en-US" smtClean="0"/>
-              <a:t>4/9/2021</a:t>
+              <a:t>4/11/2021</a:t>
             </a:fld>
             <a:endParaRPr lang="en-US"/>
           </a:p>
@@ -2913,7 +2913,7 @@
           <a:p>
             <a:fld id="{BDBB5EB8-848B-432F-B23B-EE08B2B50E45}" type="datetimeFigureOut">
               <a:rPr lang="en-US" smtClean="0"/>
-              <a:t>4/9/2021</a:t>
+              <a:t>4/11/2021</a:t>
             </a:fld>
             <a:endParaRPr lang="en-US"/>
           </a:p>
@@ -6376,7 +6376,7 @@
           <a:p>
             <a:r>
               <a:rPr lang="en-US" dirty="0"/>
-              <a:t>STOCKS(StoreID, ItemNum, Quantity, AvgCost, MinLevel)</a:t>
+              <a:t>STOCKS(StoreID, ItemNum)</a:t>
             </a:r>
           </a:p>
         </p:txBody>
@@ -6880,261 +6880,6 @@
             <a:solidFill>
               <a:schemeClr val="accent2"/>
             </a:solidFill>
-            <a:tailEnd type="triangle"/>
-          </a:ln>
-        </p:spPr>
-        <p:style>
-          <a:lnRef idx="1">
-            <a:schemeClr val="accent1"/>
-          </a:lnRef>
-          <a:fillRef idx="0">
-            <a:schemeClr val="accent1"/>
-          </a:fillRef>
-          <a:effectRef idx="0">
-            <a:schemeClr val="accent1"/>
-          </a:effectRef>
-          <a:fontRef idx="minor">
-            <a:schemeClr val="tx1"/>
-          </a:fontRef>
-        </p:style>
-      </p:cxnSp>
-      <p:cxnSp>
-        <p:nvCxnSpPr>
-          <p:cNvPr id="43" name="Straight Connector 42">
-            <a:extLst>
-              <a:ext uri="{FF2B5EF4-FFF2-40B4-BE49-F238E27FC236}">
-                <a16:creationId xmlns:a16="http://schemas.microsoft.com/office/drawing/2014/main" id="{C7DD75FC-4327-40DF-AE91-1E386C751AD5}"/>
-              </a:ext>
-            </a:extLst>
-          </p:cNvPr>
-          <p:cNvCxnSpPr>
-            <a:cxnSpLocks/>
-          </p:cNvCxnSpPr>
-          <p:nvPr/>
-        </p:nvCxnSpPr>
-        <p:spPr>
-          <a:xfrm>
-            <a:off x="5899839" y="2510765"/>
-            <a:ext cx="825567" cy="0"/>
-          </a:xfrm>
-          <a:prstGeom prst="line">
-            <a:avLst/>
-          </a:prstGeom>
-          <a:ln>
-            <a:solidFill>
-              <a:schemeClr val="accent1"/>
-            </a:solidFill>
-            <a:prstDash val="lgDash"/>
-          </a:ln>
-        </p:spPr>
-        <p:style>
-          <a:lnRef idx="1">
-            <a:schemeClr val="accent1"/>
-          </a:lnRef>
-          <a:fillRef idx="0">
-            <a:schemeClr val="accent1"/>
-          </a:fillRef>
-          <a:effectRef idx="0">
-            <a:schemeClr val="accent1"/>
-          </a:effectRef>
-          <a:fontRef idx="minor">
-            <a:schemeClr val="tx1"/>
-          </a:fontRef>
-        </p:style>
-      </p:cxnSp>
-      <p:cxnSp>
-        <p:nvCxnSpPr>
-          <p:cNvPr id="44" name="Straight Connector 43">
-            <a:extLst>
-              <a:ext uri="{FF2B5EF4-FFF2-40B4-BE49-F238E27FC236}">
-                <a16:creationId xmlns:a16="http://schemas.microsoft.com/office/drawing/2014/main" id="{0A2F1203-8732-4738-87A0-7F3937F4DAFD}"/>
-              </a:ext>
-            </a:extLst>
-          </p:cNvPr>
-          <p:cNvCxnSpPr>
-            <a:cxnSpLocks/>
-          </p:cNvCxnSpPr>
-          <p:nvPr/>
-        </p:nvCxnSpPr>
-        <p:spPr>
-          <a:xfrm>
-            <a:off x="6757120" y="2510765"/>
-            <a:ext cx="825567" cy="0"/>
-          </a:xfrm>
-          <a:prstGeom prst="line">
-            <a:avLst/>
-          </a:prstGeom>
-          <a:ln>
-            <a:solidFill>
-              <a:schemeClr val="accent1"/>
-            </a:solidFill>
-            <a:prstDash val="lgDash"/>
-          </a:ln>
-        </p:spPr>
-        <p:style>
-          <a:lnRef idx="1">
-            <a:schemeClr val="accent1"/>
-          </a:lnRef>
-          <a:fillRef idx="0">
-            <a:schemeClr val="accent1"/>
-          </a:fillRef>
-          <a:effectRef idx="0">
-            <a:schemeClr val="accent1"/>
-          </a:effectRef>
-          <a:fontRef idx="minor">
-            <a:schemeClr val="tx1"/>
-          </a:fontRef>
-        </p:style>
-      </p:cxnSp>
-      <p:cxnSp>
-        <p:nvCxnSpPr>
-          <p:cNvPr id="45" name="Straight Connector 44">
-            <a:extLst>
-              <a:ext uri="{FF2B5EF4-FFF2-40B4-BE49-F238E27FC236}">
-                <a16:creationId xmlns:a16="http://schemas.microsoft.com/office/drawing/2014/main" id="{8598751C-2423-473D-AF45-E3201FF575E4}"/>
-              </a:ext>
-            </a:extLst>
-          </p:cNvPr>
-          <p:cNvCxnSpPr>
-            <a:cxnSpLocks/>
-          </p:cNvCxnSpPr>
-          <p:nvPr/>
-        </p:nvCxnSpPr>
-        <p:spPr>
-          <a:xfrm>
-            <a:off x="7678783" y="2509388"/>
-            <a:ext cx="825567" cy="0"/>
-          </a:xfrm>
-          <a:prstGeom prst="line">
-            <a:avLst/>
-          </a:prstGeom>
-          <a:ln>
-            <a:solidFill>
-              <a:schemeClr val="accent1"/>
-            </a:solidFill>
-            <a:prstDash val="lgDash"/>
-          </a:ln>
-        </p:spPr>
-        <p:style>
-          <a:lnRef idx="1">
-            <a:schemeClr val="accent1"/>
-          </a:lnRef>
-          <a:fillRef idx="0">
-            <a:schemeClr val="accent1"/>
-          </a:fillRef>
-          <a:effectRef idx="0">
-            <a:schemeClr val="accent1"/>
-          </a:effectRef>
-          <a:fontRef idx="minor">
-            <a:schemeClr val="tx1"/>
-          </a:fontRef>
-        </p:style>
-      </p:cxnSp>
-      <p:cxnSp>
-        <p:nvCxnSpPr>
-          <p:cNvPr id="46" name="Straight Arrow Connector 45">
-            <a:extLst>
-              <a:ext uri="{FF2B5EF4-FFF2-40B4-BE49-F238E27FC236}">
-                <a16:creationId xmlns:a16="http://schemas.microsoft.com/office/drawing/2014/main" id="{B0093A60-A614-4511-9FC9-667162926363}"/>
-              </a:ext>
-            </a:extLst>
-          </p:cNvPr>
-          <p:cNvCxnSpPr>
-            <a:cxnSpLocks/>
-          </p:cNvCxnSpPr>
-          <p:nvPr/>
-        </p:nvCxnSpPr>
-        <p:spPr>
-          <a:xfrm flipH="1">
-            <a:off x="4841945" y="2554698"/>
-            <a:ext cx="1470678" cy="501818"/>
-          </a:xfrm>
-          <a:prstGeom prst="straightConnector1">
-            <a:avLst/>
-          </a:prstGeom>
-          <a:ln>
-            <a:tailEnd type="triangle"/>
-          </a:ln>
-        </p:spPr>
-        <p:style>
-          <a:lnRef idx="1">
-            <a:schemeClr val="accent1"/>
-          </a:lnRef>
-          <a:fillRef idx="0">
-            <a:schemeClr val="accent1"/>
-          </a:fillRef>
-          <a:effectRef idx="0">
-            <a:schemeClr val="accent1"/>
-          </a:effectRef>
-          <a:fontRef idx="minor">
-            <a:schemeClr val="tx1"/>
-          </a:fontRef>
-        </p:style>
-      </p:cxnSp>
-      <p:cxnSp>
-        <p:nvCxnSpPr>
-          <p:cNvPr id="48" name="Straight Arrow Connector 47">
-            <a:extLst>
-              <a:ext uri="{FF2B5EF4-FFF2-40B4-BE49-F238E27FC236}">
-                <a16:creationId xmlns:a16="http://schemas.microsoft.com/office/drawing/2014/main" id="{63F4ABCB-51CE-4DFF-B8D1-D881E7ED41FD}"/>
-              </a:ext>
-            </a:extLst>
-          </p:cNvPr>
-          <p:cNvCxnSpPr>
-            <a:cxnSpLocks/>
-          </p:cNvCxnSpPr>
-          <p:nvPr/>
-        </p:nvCxnSpPr>
-        <p:spPr>
-          <a:xfrm flipH="1">
-            <a:off x="6117011" y="2579586"/>
-            <a:ext cx="995505" cy="476930"/>
-          </a:xfrm>
-          <a:prstGeom prst="straightConnector1">
-            <a:avLst/>
-          </a:prstGeom>
-          <a:ln>
-            <a:tailEnd type="triangle"/>
-          </a:ln>
-        </p:spPr>
-        <p:style>
-          <a:lnRef idx="1">
-            <a:schemeClr val="accent1"/>
-          </a:lnRef>
-          <a:fillRef idx="0">
-            <a:schemeClr val="accent1"/>
-          </a:fillRef>
-          <a:effectRef idx="0">
-            <a:schemeClr val="accent1"/>
-          </a:effectRef>
-          <a:fontRef idx="minor">
-            <a:schemeClr val="tx1"/>
-          </a:fontRef>
-        </p:style>
-      </p:cxnSp>
-      <p:cxnSp>
-        <p:nvCxnSpPr>
-          <p:cNvPr id="50" name="Straight Arrow Connector 49">
-            <a:extLst>
-              <a:ext uri="{FF2B5EF4-FFF2-40B4-BE49-F238E27FC236}">
-                <a16:creationId xmlns:a16="http://schemas.microsoft.com/office/drawing/2014/main" id="{BE4BD521-1470-4164-BD74-FF832C703F2A}"/>
-              </a:ext>
-            </a:extLst>
-          </p:cNvPr>
-          <p:cNvCxnSpPr>
-            <a:cxnSpLocks/>
-          </p:cNvCxnSpPr>
-          <p:nvPr/>
-        </p:nvCxnSpPr>
-        <p:spPr>
-          <a:xfrm>
-            <a:off x="8070877" y="2507418"/>
-            <a:ext cx="3809" cy="549098"/>
-          </a:xfrm>
-          <a:prstGeom prst="straightConnector1">
-            <a:avLst/>
-          </a:prstGeom>
-          <a:ln>
             <a:tailEnd type="triangle"/>
           </a:ln>
         </p:spPr>

</xml_diff>

<commit_message>
changed GV relational schema for Quantity
</commit_message>
<xml_diff>
--- a/Relational Schema and ER Diagram.pptx
+++ b/Relational Schema and ER Diagram.pptx
@@ -7044,7 +7044,15 @@
             </a:r>
             <a:r>
               <a:rPr lang="en-US" dirty="0"/>
-              <a:t>, MaterialName, Quantity, Unit, MinLevel)</a:t>
+              <a:t>, MaterialName, </a:t>
+            </a:r>
+            <a:r>
+              <a:rPr lang="en-US" u="sng" dirty="0"/>
+              <a:t>Quantity</a:t>
+            </a:r>
+            <a:r>
+              <a:rPr lang="en-US" dirty="0"/>
+              <a:t>, Unit, MinLevel)</a:t>
             </a:r>
           </a:p>
         </p:txBody>
@@ -7087,7 +7095,15 @@
             </a:r>
             <a:r>
               <a:rPr lang="fr-FR" dirty="0"/>
-              <a:t>, ProductName, Description, Quantity, Unit, AvgCost)</a:t>
+              <a:t>, ProductName, Description, </a:t>
+            </a:r>
+            <a:r>
+              <a:rPr lang="fr-FR" u="sng" dirty="0"/>
+              <a:t>Quantity</a:t>
+            </a:r>
+            <a:r>
+              <a:rPr lang="fr-FR" dirty="0"/>
+              <a:t>, Unit, AvgCost)</a:t>
             </a:r>
             <a:endParaRPr lang="en-US" dirty="0"/>
           </a:p>
@@ -8239,6 +8255,261 @@
               <a:schemeClr val="accent1"/>
             </a:solidFill>
             <a:prstDash val="lgDash"/>
+          </a:ln>
+        </p:spPr>
+        <p:style>
+          <a:lnRef idx="1">
+            <a:schemeClr val="accent1"/>
+          </a:lnRef>
+          <a:fillRef idx="0">
+            <a:schemeClr val="accent1"/>
+          </a:fillRef>
+          <a:effectRef idx="0">
+            <a:schemeClr val="accent1"/>
+          </a:effectRef>
+          <a:fontRef idx="minor">
+            <a:schemeClr val="tx1"/>
+          </a:fontRef>
+        </p:style>
+      </p:cxnSp>
+      <p:cxnSp>
+        <p:nvCxnSpPr>
+          <p:cNvPr id="34" name="Straight Connector 33">
+            <a:extLst>
+              <a:ext uri="{FF2B5EF4-FFF2-40B4-BE49-F238E27FC236}">
+                <a16:creationId xmlns:a16="http://schemas.microsoft.com/office/drawing/2014/main" id="{13AFA646-B3DE-4EC3-AF92-2F654D32DED2}"/>
+              </a:ext>
+            </a:extLst>
+          </p:cNvPr>
+          <p:cNvCxnSpPr>
+            <a:cxnSpLocks/>
+          </p:cNvCxnSpPr>
+          <p:nvPr/>
+        </p:nvCxnSpPr>
+        <p:spPr>
+          <a:xfrm>
+            <a:off x="3444974" y="3155787"/>
+            <a:ext cx="767262" cy="0"/>
+          </a:xfrm>
+          <a:prstGeom prst="line">
+            <a:avLst/>
+          </a:prstGeom>
+          <a:ln>
+            <a:solidFill>
+              <a:schemeClr val="accent1"/>
+            </a:solidFill>
+            <a:prstDash val="lgDash"/>
+          </a:ln>
+        </p:spPr>
+        <p:style>
+          <a:lnRef idx="1">
+            <a:schemeClr val="accent1"/>
+          </a:lnRef>
+          <a:fillRef idx="0">
+            <a:schemeClr val="accent1"/>
+          </a:fillRef>
+          <a:effectRef idx="0">
+            <a:schemeClr val="accent1"/>
+          </a:effectRef>
+          <a:fontRef idx="minor">
+            <a:schemeClr val="tx1"/>
+          </a:fontRef>
+        </p:style>
+      </p:cxnSp>
+      <p:cxnSp>
+        <p:nvCxnSpPr>
+          <p:cNvPr id="36" name="Straight Connector 35">
+            <a:extLst>
+              <a:ext uri="{FF2B5EF4-FFF2-40B4-BE49-F238E27FC236}">
+                <a16:creationId xmlns:a16="http://schemas.microsoft.com/office/drawing/2014/main" id="{836B4FB0-653D-4BF7-BD6D-4AC061DE83B3}"/>
+              </a:ext>
+            </a:extLst>
+          </p:cNvPr>
+          <p:cNvCxnSpPr>
+            <a:cxnSpLocks/>
+          </p:cNvCxnSpPr>
+          <p:nvPr/>
+        </p:nvCxnSpPr>
+        <p:spPr>
+          <a:xfrm>
+            <a:off x="7185172" y="5751599"/>
+            <a:ext cx="767262" cy="0"/>
+          </a:xfrm>
+          <a:prstGeom prst="line">
+            <a:avLst/>
+          </a:prstGeom>
+          <a:ln>
+            <a:solidFill>
+              <a:schemeClr val="accent1"/>
+            </a:solidFill>
+            <a:prstDash val="lgDash"/>
+          </a:ln>
+        </p:spPr>
+        <p:style>
+          <a:lnRef idx="1">
+            <a:schemeClr val="accent1"/>
+          </a:lnRef>
+          <a:fillRef idx="0">
+            <a:schemeClr val="accent1"/>
+          </a:fillRef>
+          <a:effectRef idx="0">
+            <a:schemeClr val="accent1"/>
+          </a:effectRef>
+          <a:fontRef idx="minor">
+            <a:schemeClr val="tx1"/>
+          </a:fontRef>
+        </p:style>
+      </p:cxnSp>
+      <p:cxnSp>
+        <p:nvCxnSpPr>
+          <p:cNvPr id="37" name="Straight Arrow Connector 36">
+            <a:extLst>
+              <a:ext uri="{FF2B5EF4-FFF2-40B4-BE49-F238E27FC236}">
+                <a16:creationId xmlns:a16="http://schemas.microsoft.com/office/drawing/2014/main" id="{22A06B2D-CE95-4D72-A1CB-BB70BEB4A26B}"/>
+              </a:ext>
+            </a:extLst>
+          </p:cNvPr>
+          <p:cNvCxnSpPr>
+            <a:cxnSpLocks/>
+          </p:cNvCxnSpPr>
+          <p:nvPr/>
+        </p:nvCxnSpPr>
+        <p:spPr>
+          <a:xfrm flipV="1">
+            <a:off x="3759691" y="2703537"/>
+            <a:ext cx="1484868" cy="206191"/>
+          </a:xfrm>
+          <a:prstGeom prst="straightConnector1">
+            <a:avLst/>
+          </a:prstGeom>
+          <a:ln>
+            <a:tailEnd type="triangle"/>
+          </a:ln>
+        </p:spPr>
+        <p:style>
+          <a:lnRef idx="1">
+            <a:schemeClr val="accent1"/>
+          </a:lnRef>
+          <a:fillRef idx="0">
+            <a:schemeClr val="accent1"/>
+          </a:fillRef>
+          <a:effectRef idx="0">
+            <a:schemeClr val="accent1"/>
+          </a:effectRef>
+          <a:fontRef idx="minor">
+            <a:schemeClr val="tx1"/>
+          </a:fontRef>
+        </p:style>
+      </p:cxnSp>
+      <p:cxnSp>
+        <p:nvCxnSpPr>
+          <p:cNvPr id="39" name="Straight Arrow Connector 38">
+            <a:extLst>
+              <a:ext uri="{FF2B5EF4-FFF2-40B4-BE49-F238E27FC236}">
+                <a16:creationId xmlns:a16="http://schemas.microsoft.com/office/drawing/2014/main" id="{DC0F034F-BA6B-4CAF-9B97-1E1A75E4179B}"/>
+              </a:ext>
+            </a:extLst>
+          </p:cNvPr>
+          <p:cNvCxnSpPr>
+            <a:cxnSpLocks/>
+          </p:cNvCxnSpPr>
+          <p:nvPr/>
+        </p:nvCxnSpPr>
+        <p:spPr>
+          <a:xfrm flipV="1">
+            <a:off x="7608015" y="4653030"/>
+            <a:ext cx="1710914" cy="821204"/>
+          </a:xfrm>
+          <a:prstGeom prst="straightConnector1">
+            <a:avLst/>
+          </a:prstGeom>
+          <a:ln>
+            <a:tailEnd type="triangle"/>
+          </a:ln>
+        </p:spPr>
+        <p:style>
+          <a:lnRef idx="1">
+            <a:schemeClr val="accent1"/>
+          </a:lnRef>
+          <a:fillRef idx="0">
+            <a:schemeClr val="accent1"/>
+          </a:fillRef>
+          <a:effectRef idx="0">
+            <a:schemeClr val="accent1"/>
+          </a:effectRef>
+          <a:fontRef idx="minor">
+            <a:schemeClr val="tx1"/>
+          </a:fontRef>
+        </p:style>
+      </p:cxnSp>
+      <p:cxnSp>
+        <p:nvCxnSpPr>
+          <p:cNvPr id="42" name="Straight Connector 41">
+            <a:extLst>
+              <a:ext uri="{FF2B5EF4-FFF2-40B4-BE49-F238E27FC236}">
+                <a16:creationId xmlns:a16="http://schemas.microsoft.com/office/drawing/2014/main" id="{288153F8-22EA-4BF1-B339-78D511565DD4}"/>
+              </a:ext>
+            </a:extLst>
+          </p:cNvPr>
+          <p:cNvCxnSpPr>
+            <a:cxnSpLocks/>
+          </p:cNvCxnSpPr>
+          <p:nvPr/>
+        </p:nvCxnSpPr>
+        <p:spPr>
+          <a:xfrm>
+            <a:off x="3215213" y="1993099"/>
+            <a:ext cx="789611" cy="9965"/>
+          </a:xfrm>
+          <a:prstGeom prst="line">
+            <a:avLst/>
+          </a:prstGeom>
+          <a:ln>
+            <a:solidFill>
+              <a:schemeClr val="accent1"/>
+            </a:solidFill>
+            <a:prstDash val="lgDash"/>
+          </a:ln>
+        </p:spPr>
+        <p:style>
+          <a:lnRef idx="1">
+            <a:schemeClr val="accent1"/>
+          </a:lnRef>
+          <a:fillRef idx="0">
+            <a:schemeClr val="accent1"/>
+          </a:fillRef>
+          <a:effectRef idx="0">
+            <a:schemeClr val="accent1"/>
+          </a:effectRef>
+          <a:fontRef idx="minor">
+            <a:schemeClr val="tx1"/>
+          </a:fontRef>
+        </p:style>
+      </p:cxnSp>
+      <p:cxnSp>
+        <p:nvCxnSpPr>
+          <p:cNvPr id="47" name="Straight Arrow Connector 46">
+            <a:extLst>
+              <a:ext uri="{FF2B5EF4-FFF2-40B4-BE49-F238E27FC236}">
+                <a16:creationId xmlns:a16="http://schemas.microsoft.com/office/drawing/2014/main" id="{6DC60606-75C8-4F61-918C-595030A864D4}"/>
+              </a:ext>
+            </a:extLst>
+          </p:cNvPr>
+          <p:cNvCxnSpPr>
+            <a:cxnSpLocks/>
+          </p:cNvCxnSpPr>
+          <p:nvPr/>
+        </p:nvCxnSpPr>
+        <p:spPr>
+          <a:xfrm>
+            <a:off x="3560783" y="2038345"/>
+            <a:ext cx="1757964" cy="340759"/>
+          </a:xfrm>
+          <a:prstGeom prst="straightConnector1">
+            <a:avLst/>
+          </a:prstGeom>
+          <a:ln>
+            <a:tailEnd type="triangle"/>
           </a:ln>
         </p:spPr>
         <p:style>

</xml_diff>

<commit_message>
added LD ER Diagram
</commit_message>
<xml_diff>
--- a/Relational Schema and ER Diagram.pptx
+++ b/Relational Schema and ER Diagram.pptx
@@ -8,8 +8,9 @@
     <p:sldId id="256" r:id="rId2"/>
     <p:sldId id="257" r:id="rId3"/>
     <p:sldId id="258" r:id="rId4"/>
-    <p:sldId id="259" r:id="rId5"/>
-    <p:sldId id="260" r:id="rId6"/>
+    <p:sldId id="261" r:id="rId5"/>
+    <p:sldId id="259" r:id="rId6"/>
+    <p:sldId id="260" r:id="rId7"/>
   </p:sldIdLst>
   <p:sldSz cx="12192000" cy="6858000"/>
   <p:notesSz cx="6858000" cy="9144000"/>
@@ -8559,6 +8560,72 @@
       </p:grpSpPr>
       <p:pic>
         <p:nvPicPr>
+          <p:cNvPr id="3" name="Picture 2" descr="Diagram&#10;&#10;Description automatically generated">
+            <a:extLst>
+              <a:ext uri="{FF2B5EF4-FFF2-40B4-BE49-F238E27FC236}">
+                <a16:creationId xmlns:a16="http://schemas.microsoft.com/office/drawing/2014/main" id="{85E81988-B7D8-4357-A766-2E81FA055077}"/>
+              </a:ext>
+            </a:extLst>
+          </p:cNvPr>
+          <p:cNvPicPr>
+            <a:picLocks noChangeAspect="1"/>
+          </p:cNvPicPr>
+          <p:nvPr/>
+        </p:nvPicPr>
+        <p:blipFill>
+          <a:blip r:embed="rId2">
+            <a:extLst>
+              <a:ext uri="{28A0092B-C50C-407E-A947-70E740481C1C}">
+                <a14:useLocalDpi xmlns:a14="http://schemas.microsoft.com/office/drawing/2010/main" val="0"/>
+              </a:ext>
+            </a:extLst>
+          </a:blip>
+          <a:stretch>
+            <a:fillRect/>
+          </a:stretch>
+        </p:blipFill>
+        <p:spPr>
+          <a:xfrm>
+            <a:off x="148074" y="68289"/>
+            <a:ext cx="11895851" cy="6721422"/>
+          </a:xfrm>
+          <a:prstGeom prst="rect">
+            <a:avLst/>
+          </a:prstGeom>
+        </p:spPr>
+      </p:pic>
+    </p:spTree>
+    <p:extLst>
+      <p:ext uri="{BB962C8B-B14F-4D97-AF65-F5344CB8AC3E}">
+        <p14:creationId xmlns:p14="http://schemas.microsoft.com/office/powerpoint/2010/main" val="749529161"/>
+      </p:ext>
+    </p:extLst>
+  </p:cSld>
+  <p:clrMapOvr>
+    <a:masterClrMapping/>
+  </p:clrMapOvr>
+</p:sld>
+</file>
+
+<file path=ppt/slides/slide5.xml><?xml version="1.0" encoding="utf-8"?>
+<p:sld xmlns:a="http://schemas.openxmlformats.org/drawingml/2006/main" xmlns:r="http://schemas.openxmlformats.org/officeDocument/2006/relationships" xmlns:p="http://schemas.openxmlformats.org/presentationml/2006/main">
+  <p:cSld>
+    <p:spTree>
+      <p:nvGrpSpPr>
+        <p:cNvPr id="1" name=""/>
+        <p:cNvGrpSpPr/>
+        <p:nvPr/>
+      </p:nvGrpSpPr>
+      <p:grpSpPr>
+        <a:xfrm>
+          <a:off x="0" y="0"/>
+          <a:ext cx="0" cy="0"/>
+          <a:chOff x="0" y="0"/>
+          <a:chExt cx="0" cy="0"/>
+        </a:xfrm>
+      </p:grpSpPr>
+      <p:pic>
+        <p:nvPicPr>
           <p:cNvPr id="16" name="Picture 15" descr="Diagram&#10;&#10;Description automatically generated">
             <a:extLst>
               <a:ext uri="{FF2B5EF4-FFF2-40B4-BE49-F238E27FC236}">
@@ -8905,7 +8972,7 @@
 </p:sld>
 </file>
 
-<file path=ppt/slides/slide5.xml><?xml version="1.0" encoding="utf-8"?>
+<file path=ppt/slides/slide6.xml><?xml version="1.0" encoding="utf-8"?>
 <p:sld xmlns:a="http://schemas.openxmlformats.org/drawingml/2006/main" xmlns:r="http://schemas.openxmlformats.org/officeDocument/2006/relationships" xmlns:p="http://schemas.openxmlformats.org/presentationml/2006/main">
   <p:cSld>
     <p:spTree>

</xml_diff>

<commit_message>
Changed person relation to many
</commit_message>
<xml_diff>
--- a/Relational Schema and ER Diagram.pptx
+++ b/Relational Schema and ER Diagram.pptx
@@ -264,7 +264,7 @@
           <a:p>
             <a:fld id="{BDBB5EB8-848B-432F-B23B-EE08B2B50E45}" type="datetimeFigureOut">
               <a:rPr lang="en-US" smtClean="0"/>
-              <a:t>4/11/2021</a:t>
+              <a:t>5/6/2021</a:t>
             </a:fld>
             <a:endParaRPr lang="en-US"/>
           </a:p>
@@ -462,7 +462,7 @@
           <a:p>
             <a:fld id="{BDBB5EB8-848B-432F-B23B-EE08B2B50E45}" type="datetimeFigureOut">
               <a:rPr lang="en-US" smtClean="0"/>
-              <a:t>4/11/2021</a:t>
+              <a:t>5/6/2021</a:t>
             </a:fld>
             <a:endParaRPr lang="en-US"/>
           </a:p>
@@ -670,7 +670,7 @@
           <a:p>
             <a:fld id="{BDBB5EB8-848B-432F-B23B-EE08B2B50E45}" type="datetimeFigureOut">
               <a:rPr lang="en-US" smtClean="0"/>
-              <a:t>4/11/2021</a:t>
+              <a:t>5/6/2021</a:t>
             </a:fld>
             <a:endParaRPr lang="en-US"/>
           </a:p>
@@ -868,7 +868,7 @@
           <a:p>
             <a:fld id="{BDBB5EB8-848B-432F-B23B-EE08B2B50E45}" type="datetimeFigureOut">
               <a:rPr lang="en-US" smtClean="0"/>
-              <a:t>4/11/2021</a:t>
+              <a:t>5/6/2021</a:t>
             </a:fld>
             <a:endParaRPr lang="en-US"/>
           </a:p>
@@ -1143,7 +1143,7 @@
           <a:p>
             <a:fld id="{BDBB5EB8-848B-432F-B23B-EE08B2B50E45}" type="datetimeFigureOut">
               <a:rPr lang="en-US" smtClean="0"/>
-              <a:t>4/11/2021</a:t>
+              <a:t>5/6/2021</a:t>
             </a:fld>
             <a:endParaRPr lang="en-US"/>
           </a:p>
@@ -1408,7 +1408,7 @@
           <a:p>
             <a:fld id="{BDBB5EB8-848B-432F-B23B-EE08B2B50E45}" type="datetimeFigureOut">
               <a:rPr lang="en-US" smtClean="0"/>
-              <a:t>4/11/2021</a:t>
+              <a:t>5/6/2021</a:t>
             </a:fld>
             <a:endParaRPr lang="en-US"/>
           </a:p>
@@ -1820,7 +1820,7 @@
           <a:p>
             <a:fld id="{BDBB5EB8-848B-432F-B23B-EE08B2B50E45}" type="datetimeFigureOut">
               <a:rPr lang="en-US" smtClean="0"/>
-              <a:t>4/11/2021</a:t>
+              <a:t>5/6/2021</a:t>
             </a:fld>
             <a:endParaRPr lang="en-US"/>
           </a:p>
@@ -1961,7 +1961,7 @@
           <a:p>
             <a:fld id="{BDBB5EB8-848B-432F-B23B-EE08B2B50E45}" type="datetimeFigureOut">
               <a:rPr lang="en-US" smtClean="0"/>
-              <a:t>4/11/2021</a:t>
+              <a:t>5/6/2021</a:t>
             </a:fld>
             <a:endParaRPr lang="en-US"/>
           </a:p>
@@ -2074,7 +2074,7 @@
           <a:p>
             <a:fld id="{BDBB5EB8-848B-432F-B23B-EE08B2B50E45}" type="datetimeFigureOut">
               <a:rPr lang="en-US" smtClean="0"/>
-              <a:t>4/11/2021</a:t>
+              <a:t>5/6/2021</a:t>
             </a:fld>
             <a:endParaRPr lang="en-US"/>
           </a:p>
@@ -2385,7 +2385,7 @@
           <a:p>
             <a:fld id="{BDBB5EB8-848B-432F-B23B-EE08B2B50E45}" type="datetimeFigureOut">
               <a:rPr lang="en-US" smtClean="0"/>
-              <a:t>4/11/2021</a:t>
+              <a:t>5/6/2021</a:t>
             </a:fld>
             <a:endParaRPr lang="en-US"/>
           </a:p>
@@ -2673,7 +2673,7 @@
           <a:p>
             <a:fld id="{BDBB5EB8-848B-432F-B23B-EE08B2B50E45}" type="datetimeFigureOut">
               <a:rPr lang="en-US" smtClean="0"/>
-              <a:t>4/11/2021</a:t>
+              <a:t>5/6/2021</a:t>
             </a:fld>
             <a:endParaRPr lang="en-US"/>
           </a:p>
@@ -2914,7 +2914,7 @@
           <a:p>
             <a:fld id="{BDBB5EB8-848B-432F-B23B-EE08B2B50E45}" type="datetimeFigureOut">
               <a:rPr lang="en-US" smtClean="0"/>
-              <a:t>4/11/2021</a:t>
+              <a:t>5/6/2021</a:t>
             </a:fld>
             <a:endParaRPr lang="en-US"/>
           </a:p>
@@ -8594,6 +8594,208 @@
           </a:prstGeom>
         </p:spPr>
       </p:pic>
+      <p:sp>
+        <p:nvSpPr>
+          <p:cNvPr id="2" name="Rectangle 1">
+            <a:extLst>
+              <a:ext uri="{FF2B5EF4-FFF2-40B4-BE49-F238E27FC236}">
+                <a16:creationId xmlns:a16="http://schemas.microsoft.com/office/drawing/2014/main" id="{CF2E9C84-C9D5-4548-9B3C-E22DAE2FF1A9}"/>
+              </a:ext>
+            </a:extLst>
+          </p:cNvPr>
+          <p:cNvSpPr/>
+          <p:nvPr/>
+        </p:nvSpPr>
+        <p:spPr>
+          <a:xfrm>
+            <a:off x="3162650" y="3531765"/>
+            <a:ext cx="167779" cy="151002"/>
+          </a:xfrm>
+          <a:prstGeom prst="rect">
+            <a:avLst/>
+          </a:prstGeom>
+          <a:ln>
+            <a:solidFill>
+              <a:schemeClr val="bg1"/>
+            </a:solidFill>
+          </a:ln>
+        </p:spPr>
+        <p:style>
+          <a:lnRef idx="2">
+            <a:schemeClr val="dk1"/>
+          </a:lnRef>
+          <a:fillRef idx="1">
+            <a:schemeClr val="lt1"/>
+          </a:fillRef>
+          <a:effectRef idx="0">
+            <a:schemeClr val="dk1"/>
+          </a:effectRef>
+          <a:fontRef idx="minor">
+            <a:schemeClr val="dk1"/>
+          </a:fontRef>
+        </p:style>
+        <p:txBody>
+          <a:bodyPr rtlCol="0" anchor="ctr"/>
+          <a:lstStyle/>
+          <a:p>
+            <a:pPr algn="ctr"/>
+            <a:endParaRPr lang="en-US"/>
+          </a:p>
+        </p:txBody>
+      </p:sp>
+      <p:sp>
+        <p:nvSpPr>
+          <p:cNvPr id="4" name="Rectangle 3">
+            <a:extLst>
+              <a:ext uri="{FF2B5EF4-FFF2-40B4-BE49-F238E27FC236}">
+                <a16:creationId xmlns:a16="http://schemas.microsoft.com/office/drawing/2014/main" id="{9D066F8B-B936-4FBA-9234-82F83D1477D9}"/>
+              </a:ext>
+            </a:extLst>
+          </p:cNvPr>
+          <p:cNvSpPr/>
+          <p:nvPr/>
+        </p:nvSpPr>
+        <p:spPr>
+          <a:xfrm>
+            <a:off x="3078760" y="4011336"/>
+            <a:ext cx="167779" cy="151002"/>
+          </a:xfrm>
+          <a:prstGeom prst="rect">
+            <a:avLst/>
+          </a:prstGeom>
+          <a:ln>
+            <a:solidFill>
+              <a:schemeClr val="bg1"/>
+            </a:solidFill>
+          </a:ln>
+        </p:spPr>
+        <p:style>
+          <a:lnRef idx="2">
+            <a:schemeClr val="dk1"/>
+          </a:lnRef>
+          <a:fillRef idx="1">
+            <a:schemeClr val="lt1"/>
+          </a:fillRef>
+          <a:effectRef idx="0">
+            <a:schemeClr val="dk1"/>
+          </a:effectRef>
+          <a:fontRef idx="minor">
+            <a:schemeClr val="dk1"/>
+          </a:fontRef>
+        </p:style>
+        <p:txBody>
+          <a:bodyPr rtlCol="0" anchor="ctr"/>
+          <a:lstStyle/>
+          <a:p>
+            <a:pPr algn="ctr"/>
+            <a:r>
+              <a:rPr lang="en-US" sz="1000" dirty="0"/>
+              <a:t>M</a:t>
+            </a:r>
+          </a:p>
+        </p:txBody>
+      </p:sp>
+      <p:sp>
+        <p:nvSpPr>
+          <p:cNvPr id="5" name="Rectangle 4">
+            <a:extLst>
+              <a:ext uri="{FF2B5EF4-FFF2-40B4-BE49-F238E27FC236}">
+                <a16:creationId xmlns:a16="http://schemas.microsoft.com/office/drawing/2014/main" id="{F76C3D7E-AA3D-4739-9832-5328F43DA994}"/>
+              </a:ext>
+            </a:extLst>
+          </p:cNvPr>
+          <p:cNvSpPr/>
+          <p:nvPr/>
+        </p:nvSpPr>
+        <p:spPr>
+          <a:xfrm>
+            <a:off x="3087149" y="4558018"/>
+            <a:ext cx="167779" cy="151002"/>
+          </a:xfrm>
+          <a:prstGeom prst="rect">
+            <a:avLst/>
+          </a:prstGeom>
+          <a:ln>
+            <a:solidFill>
+              <a:schemeClr val="bg1"/>
+            </a:solidFill>
+          </a:ln>
+        </p:spPr>
+        <p:style>
+          <a:lnRef idx="2">
+            <a:schemeClr val="dk1"/>
+          </a:lnRef>
+          <a:fillRef idx="1">
+            <a:schemeClr val="lt1"/>
+          </a:fillRef>
+          <a:effectRef idx="0">
+            <a:schemeClr val="dk1"/>
+          </a:effectRef>
+          <a:fontRef idx="minor">
+            <a:schemeClr val="dk1"/>
+          </a:fontRef>
+        </p:style>
+        <p:txBody>
+          <a:bodyPr rtlCol="0" anchor="ctr"/>
+          <a:lstStyle/>
+          <a:p>
+            <a:pPr algn="ctr"/>
+            <a:endParaRPr lang="en-US"/>
+          </a:p>
+        </p:txBody>
+      </p:sp>
+      <p:sp>
+        <p:nvSpPr>
+          <p:cNvPr id="6" name="Rectangle 5">
+            <a:extLst>
+              <a:ext uri="{FF2B5EF4-FFF2-40B4-BE49-F238E27FC236}">
+                <a16:creationId xmlns:a16="http://schemas.microsoft.com/office/drawing/2014/main" id="{4A1CA5F4-4E33-4448-82B3-27206EAA1ACA}"/>
+              </a:ext>
+            </a:extLst>
+          </p:cNvPr>
+          <p:cNvSpPr/>
+          <p:nvPr/>
+        </p:nvSpPr>
+        <p:spPr>
+          <a:xfrm>
+            <a:off x="3036815" y="4532961"/>
+            <a:ext cx="167779" cy="151002"/>
+          </a:xfrm>
+          <a:prstGeom prst="rect">
+            <a:avLst/>
+          </a:prstGeom>
+          <a:ln>
+            <a:solidFill>
+              <a:schemeClr val="bg1"/>
+            </a:solidFill>
+          </a:ln>
+        </p:spPr>
+        <p:style>
+          <a:lnRef idx="2">
+            <a:schemeClr val="dk1"/>
+          </a:lnRef>
+          <a:fillRef idx="1">
+            <a:schemeClr val="lt1"/>
+          </a:fillRef>
+          <a:effectRef idx="0">
+            <a:schemeClr val="dk1"/>
+          </a:effectRef>
+          <a:fontRef idx="minor">
+            <a:schemeClr val="dk1"/>
+          </a:fontRef>
+        </p:style>
+        <p:txBody>
+          <a:bodyPr rtlCol="0" anchor="ctr"/>
+          <a:lstStyle/>
+          <a:p>
+            <a:pPr algn="ctr"/>
+            <a:r>
+              <a:rPr lang="en-US" sz="1000" dirty="0"/>
+              <a:t>M</a:t>
+            </a:r>
+          </a:p>
+        </p:txBody>
+      </p:sp>
     </p:spTree>
     <p:extLst>
       <p:ext uri="{BB962C8B-B14F-4D97-AF65-F5344CB8AC3E}">

</xml_diff>